<commit_message>
Adicionadas informacoes a respeito da apresentacaoV8.pptx
</commit_message>
<xml_diff>
--- a/Dot Project EAP/4. System Management/Apresentacoes/apresentacaoV8.pptx
+++ b/Dot Project EAP/4. System Management/Apresentacoes/apresentacaoV8.pptx
@@ -372,6 +372,11 @@
         </p:txBody>
       </p:sp>
     </p:spTree>
+    <p:extLst>
+      <p:ext uri="{BB962C8B-B14F-4D97-AF65-F5344CB8AC3E}">
+        <p14:creationId xmlns:p14="http://schemas.microsoft.com/office/powerpoint/2010/main" val="3595537806"/>
+      </p:ext>
+    </p:extLst>
   </p:cSld>
   <p:clrMap bg1="lt1" tx1="dk1" bg2="lt2" tx2="dk2" accent1="accent1" accent2="accent2" accent3="accent3" accent4="accent4" accent5="accent5" accent6="accent6" hlink="hlink" folHlink="folHlink"/>
   <p:notesStyle>
@@ -3525,49 +3530,7 @@
                 <a:ea typeface="Tahoma" pitchFamily="34" charset="0"/>
                 <a:cs typeface="Arial" pitchFamily="34" charset="0"/>
               </a:rPr>
-              <a:t>	</a:t>
-            </a:r>
-            <a:r>
-              <a:rPr lang="pt-BR" dirty="0" smtClean="0">
-                <a:solidFill>
-                  <a:schemeClr val="tx1">
-                    <a:lumMod val="50000"/>
-                    <a:lumOff val="50000"/>
-                  </a:schemeClr>
-                </a:solidFill>
-                <a:latin typeface="Arial" pitchFamily="34" charset="0"/>
-                <a:ea typeface="Tahoma" pitchFamily="34" charset="0"/>
-                <a:cs typeface="Arial" pitchFamily="34" charset="0"/>
-              </a:rPr>
-              <a:t>Guilherme </a:t>
-            </a:r>
-            <a:r>
-              <a:rPr lang="pt-BR" dirty="0" err="1" smtClean="0">
-                <a:solidFill>
-                  <a:schemeClr val="tx1">
-                    <a:lumMod val="50000"/>
-                    <a:lumOff val="50000"/>
-                  </a:schemeClr>
-                </a:solidFill>
-                <a:latin typeface="Arial" pitchFamily="34" charset="0"/>
-                <a:ea typeface="Tahoma" pitchFamily="34" charset="0"/>
-                <a:cs typeface="Arial" pitchFamily="34" charset="0"/>
-              </a:rPr>
-              <a:t>Calixto</a:t>
-            </a:r>
-            <a:r>
-              <a:rPr lang="pt-BR" dirty="0" smtClean="0">
-                <a:solidFill>
-                  <a:schemeClr val="tx1">
-                    <a:lumMod val="50000"/>
-                    <a:lumOff val="50000"/>
-                  </a:schemeClr>
-                </a:solidFill>
-                <a:latin typeface="Arial" pitchFamily="34" charset="0"/>
-                <a:ea typeface="Tahoma" pitchFamily="34" charset="0"/>
-                <a:cs typeface="Arial" pitchFamily="34" charset="0"/>
-              </a:rPr>
-              <a:t/>
+              <a:t>	Guilherme Calixto</a:t>
             </a:r>
             <a:br>
               <a:rPr lang="pt-BR" dirty="0" smtClean="0">
@@ -4835,21 +4798,7 @@
                 <a:latin typeface="Arial" pitchFamily="34" charset="0"/>
                 <a:cs typeface="Arial" pitchFamily="34" charset="0"/>
               </a:rPr>
-              <a:t>Obter conhecimento diversificado sobre gerenciamento de projetos tradicionais e ágeis além de</a:t>
-            </a:r>
-            <a:r>
-              <a:rPr lang="pt-BR" sz="2800" dirty="0" smtClean="0">
-                <a:latin typeface="Arial" pitchFamily="34" charset="0"/>
-                <a:cs typeface="Arial" pitchFamily="34" charset="0"/>
-              </a:rPr>
-              <a:t> gestão estratégica</a:t>
-            </a:r>
-            <a:r>
-              <a:rPr lang="pt-BR" sz="2800" dirty="0" smtClean="0">
-                <a:latin typeface="Arial" pitchFamily="34" charset="0"/>
-                <a:cs typeface="Arial" pitchFamily="34" charset="0"/>
-              </a:rPr>
-              <a:t>;</a:t>
+              <a:t>Obter conhecimento diversificado sobre gerenciamento de projetos tradicionais e ágeis além de gestão estratégica;</a:t>
             </a:r>
           </a:p>
           <a:p>
@@ -4907,7 +4856,15 @@
           <a:p>
             <a:r>
               <a:rPr lang="pt-BR" dirty="0" smtClean="0"/>
-              <a:t>Gestão de Portfólios e Projetos de Software – Professor </a:t>
+              <a:t>Gestão de Portfólios e Projetos de Software </a:t>
+            </a:r>
+            <a:r>
+              <a:rPr lang="pt-BR" dirty="0" smtClean="0"/>
+              <a:t> </a:t>
+            </a:r>
+            <a:r>
+              <a:rPr lang="pt-BR" dirty="0" smtClean="0"/>
+              <a:t>Professor </a:t>
             </a:r>
             <a:r>
               <a:rPr lang="pt-BR" dirty="0" err="1" smtClean="0"/>
@@ -5159,7 +5116,15 @@
           <a:p>
             <a:r>
               <a:rPr lang="pt-BR" dirty="0" smtClean="0"/>
-              <a:t>Gestão de Portfólios e Projetos de Software – Professor </a:t>
+              <a:t>Gestão de Portfólios e Projetos de Software </a:t>
+            </a:r>
+            <a:r>
+              <a:rPr lang="pt-BR" dirty="0" smtClean="0"/>
+              <a:t> </a:t>
+            </a:r>
+            <a:r>
+              <a:rPr lang="pt-BR" dirty="0" smtClean="0"/>
+              <a:t>Professor </a:t>
             </a:r>
             <a:r>
               <a:rPr lang="pt-BR" dirty="0" err="1" smtClean="0"/>
@@ -5307,10 +5272,30 @@
           </a:xfrm>
         </p:spPr>
         <p:txBody>
-          <a:bodyPr/>
-          <a:lstStyle/>
-          <a:p>
-            <a:endParaRPr lang="pt-BR" dirty="0"/>
+          <a:bodyPr>
+            <a:normAutofit/>
+          </a:bodyPr>
+          <a:lstStyle/>
+          <a:p>
+            <a:r>
+              <a:rPr lang="pt-BR" dirty="0" err="1" smtClean="0"/>
+              <a:t>PMBoK</a:t>
+            </a:r>
+            <a:endParaRPr lang="pt-BR" dirty="0" smtClean="0"/>
+          </a:p>
+          <a:p>
+            <a:r>
+              <a:rPr lang="pt-BR" dirty="0" smtClean="0"/>
+              <a:t>RUP</a:t>
+            </a:r>
+            <a:endParaRPr lang="pt-BR" dirty="0" smtClean="0"/>
+          </a:p>
+          <a:p>
+            <a:r>
+              <a:rPr lang="en-US" dirty="0" smtClean="0"/>
+              <a:t>Scrum</a:t>
+            </a:r>
+            <a:endParaRPr lang="pt-BR" dirty="0" smtClean="0"/>
           </a:p>
         </p:txBody>
       </p:sp>
@@ -5354,7 +5339,11 @@
           <a:p>
             <a:r>
               <a:rPr lang="pt-BR" dirty="0" smtClean="0"/>
-              <a:t>Gestão de Portfólios e Projetos de Software – Professor </a:t>
+              <a:t>Gestão de Portfólios e Projetos de Software </a:t>
+            </a:r>
+            <a:r>
+              <a:rPr lang="pt-BR" dirty="0" smtClean="0"/>
+              <a:t>Professor </a:t>
             </a:r>
             <a:r>
               <a:rPr lang="pt-BR" dirty="0" err="1" smtClean="0"/>
@@ -5495,12 +5484,39 @@
             <p:ph idx="1"/>
           </p:nvPr>
         </p:nvSpPr>
-        <p:spPr/>
-        <p:txBody>
-          <a:bodyPr/>
-          <a:lstStyle/>
-          <a:p>
-            <a:endParaRPr lang="pt-BR" dirty="0"/>
+        <p:spPr>
+          <a:xfrm>
+            <a:off x="395536" y="1772816"/>
+            <a:ext cx="8229600" cy="4525963"/>
+          </a:xfrm>
+        </p:spPr>
+        <p:txBody>
+          <a:bodyPr/>
+          <a:lstStyle/>
+          <a:p>
+            <a:r>
+              <a:rPr lang="pt-BR" dirty="0" smtClean="0"/>
+              <a:t>Criar indicadores do projeto baseando-os na gerencia de projetos</a:t>
+            </a:r>
+          </a:p>
+          <a:p>
+            <a:r>
+              <a:rPr lang="pt-BR" dirty="0" smtClean="0"/>
+              <a:t>Criar uma EAP dentro do </a:t>
+            </a:r>
+            <a:r>
+              <a:rPr lang="pt-BR" dirty="0" err="1" smtClean="0"/>
+              <a:t>DotProject</a:t>
+            </a:r>
+            <a:r>
+              <a:rPr lang="pt-BR" dirty="0" smtClean="0"/>
+              <a:t>, obedecendo os critérios de aceitação do </a:t>
+            </a:r>
+            <a:r>
+              <a:rPr lang="en-US" dirty="0" smtClean="0"/>
+              <a:t>product owner</a:t>
+            </a:r>
+            <a:endParaRPr lang="en-US" dirty="0"/>
           </a:p>
         </p:txBody>
       </p:sp>
@@ -5544,7 +5560,15 @@
           <a:p>
             <a:r>
               <a:rPr lang="pt-BR" dirty="0" smtClean="0"/>
-              <a:t>Gestão de Portfólios e Projetos de Software – Professor </a:t>
+              <a:t>Gestão de Portfólios e Projetos de </a:t>
+            </a:r>
+            <a:r>
+              <a:rPr lang="pt-BR" dirty="0" smtClean="0"/>
+              <a:t>Software </a:t>
+            </a:r>
+            <a:r>
+              <a:rPr lang="pt-BR" dirty="0" smtClean="0"/>
+              <a:t>Professor </a:t>
             </a:r>
             <a:r>
               <a:rPr lang="pt-BR" dirty="0" err="1" smtClean="0"/>
@@ -5685,10 +5709,86 @@
             <p:ph idx="1"/>
           </p:nvPr>
         </p:nvSpPr>
-        <p:spPr/>
-        <p:txBody>
-          <a:bodyPr/>
-          <a:lstStyle/>
+        <p:spPr>
+          <a:xfrm>
+            <a:off x="467544" y="1772816"/>
+            <a:ext cx="8229600" cy="4525963"/>
+          </a:xfrm>
+        </p:spPr>
+        <p:txBody>
+          <a:bodyPr/>
+          <a:lstStyle/>
+          <a:p>
+            <a:r>
+              <a:rPr lang="pt-BR" dirty="0" smtClean="0"/>
+              <a:t>Repositório solido, com aplicações de gerência de configuraç</a:t>
+            </a:r>
+            <a:r>
+              <a:rPr lang="pt-BR" dirty="0" smtClean="0"/>
+              <a:t>ão</a:t>
+            </a:r>
+          </a:p>
+          <a:p>
+            <a:r>
+              <a:rPr lang="en-US" dirty="0" smtClean="0"/>
+              <a:t>Site com o </a:t>
+            </a:r>
+            <a:r>
+              <a:rPr lang="pt-BR" dirty="0" smtClean="0"/>
+              <a:t>projeto</a:t>
+            </a:r>
+            <a:r>
+              <a:rPr lang="en-US" dirty="0" smtClean="0"/>
+              <a:t> </a:t>
+            </a:r>
+            <a:r>
+              <a:rPr lang="en-US" dirty="0" err="1" smtClean="0"/>
+              <a:t>hospedado</a:t>
+            </a:r>
+            <a:r>
+              <a:rPr lang="en-US" dirty="0" smtClean="0"/>
+              <a:t> </a:t>
+            </a:r>
+            <a:r>
+              <a:rPr lang="en-US" dirty="0" err="1" smtClean="0"/>
+              <a:t>na</a:t>
+            </a:r>
+            <a:r>
+              <a:rPr lang="en-US" dirty="0" smtClean="0"/>
+              <a:t> internet</a:t>
+            </a:r>
+          </a:p>
+          <a:p>
+            <a:r>
+              <a:rPr lang="en-US" dirty="0" err="1" smtClean="0"/>
+              <a:t>Criada</a:t>
+            </a:r>
+            <a:r>
+              <a:rPr lang="en-US" dirty="0" smtClean="0"/>
+              <a:t> </a:t>
+            </a:r>
+            <a:r>
+              <a:rPr lang="en-US" dirty="0" err="1" smtClean="0"/>
+              <a:t>uma</a:t>
+            </a:r>
+            <a:r>
+              <a:rPr lang="en-US" dirty="0" smtClean="0"/>
+              <a:t> EAP </a:t>
+            </a:r>
+            <a:r>
+              <a:rPr lang="en-US" dirty="0" err="1" smtClean="0"/>
+              <a:t>dentro</a:t>
+            </a:r>
+            <a:r>
+              <a:rPr lang="en-US" dirty="0" smtClean="0"/>
+              <a:t> do </a:t>
+            </a:r>
+            <a:r>
+              <a:rPr lang="en-US" dirty="0" err="1" smtClean="0"/>
+              <a:t>DotProject</a:t>
+            </a:r>
+            <a:endParaRPr lang="pt-BR" dirty="0" smtClean="0"/>
+          </a:p>
           <a:p>
             <a:endParaRPr lang="pt-BR" dirty="0"/>
           </a:p>
@@ -5875,11 +5975,38 @@
             <p:ph idx="1"/>
           </p:nvPr>
         </p:nvSpPr>
-        <p:spPr/>
-        <p:txBody>
-          <a:bodyPr/>
-          <a:lstStyle/>
-          <a:p>
+        <p:spPr>
+          <a:xfrm>
+            <a:off x="395536" y="1844824"/>
+            <a:ext cx="8229600" cy="4525963"/>
+          </a:xfrm>
+        </p:spPr>
+        <p:txBody>
+          <a:bodyPr/>
+          <a:lstStyle/>
+          <a:p>
+            <a:r>
+              <a:rPr lang="pt-BR" dirty="0" smtClean="0"/>
+              <a:t>Trabalho em grupo</a:t>
+            </a:r>
+          </a:p>
+          <a:p>
+            <a:r>
+              <a:rPr lang="pt-BR" dirty="0" smtClean="0"/>
+              <a:t>Entender as necessidades do </a:t>
+            </a:r>
+            <a:r>
+              <a:rPr lang="pt-BR" dirty="0" err="1" smtClean="0"/>
+              <a:t>product</a:t>
+            </a:r>
+            <a:r>
+              <a:rPr lang="pt-BR" dirty="0" smtClean="0"/>
+              <a:t> </a:t>
+            </a:r>
+            <a:r>
+              <a:rPr lang="pt-BR" dirty="0" err="1" smtClean="0"/>
+              <a:t>owner</a:t>
+            </a:r>
             <a:endParaRPr lang="pt-BR" dirty="0"/>
           </a:p>
         </p:txBody>

</xml_diff>